<commit_message>
Add alloy and diagrams
</commit_message>
<xml_diff>
--- a/Rasd/Requirements Analysis and Specification Document presentation.pptx
+++ b/Rasd/Requirements Analysis and Specification Document presentation.pptx
@@ -5,7 +5,7 @@
     <p:sldMasterId id="2147483648" r:id="rId1"/>
   </p:sldMasterIdLst>
   <p:notesMasterIdLst>
-    <p:notesMasterId r:id="rId12"/>
+    <p:notesMasterId r:id="rId19"/>
   </p:notesMasterIdLst>
   <p:sldIdLst>
     <p:sldId id="256" r:id="rId2"/>
@@ -17,7 +17,14 @@
     <p:sldId id="262" r:id="rId8"/>
     <p:sldId id="263" r:id="rId9"/>
     <p:sldId id="264" r:id="rId10"/>
-    <p:sldId id="265" r:id="rId11"/>
+    <p:sldId id="266" r:id="rId11"/>
+    <p:sldId id="267" r:id="rId12"/>
+    <p:sldId id="265" r:id="rId13"/>
+    <p:sldId id="268" r:id="rId14"/>
+    <p:sldId id="269" r:id="rId15"/>
+    <p:sldId id="270" r:id="rId16"/>
+    <p:sldId id="271" r:id="rId17"/>
+    <p:sldId id="272" r:id="rId18"/>
   </p:sldIdLst>
   <p:sldSz cx="12192000" cy="6858000"/>
   <p:notesSz cx="6858000" cy="9144000"/>
@@ -218,7 +225,7 @@
           <a:p>
             <a:fld id="{7376592B-A7A0-43DC-AECB-804058AECC04}" type="datetimeFigureOut">
               <a:rPr lang="it-IT" smtClean="0"/>
-              <a:t>15/11/2016</a:t>
+              <a:t>16/11/2016</a:t>
             </a:fld>
             <a:endParaRPr lang="it-IT"/>
           </a:p>
@@ -614,7 +621,7 @@
           <a:p>
             <a:fld id="{575991F0-A1ED-4CD6-B9EC-3DF3E17130D9}" type="datetime1">
               <a:rPr lang="it-IT" smtClean="0"/>
-              <a:t>15/11/2016</a:t>
+              <a:t>16/11/2016</a:t>
             </a:fld>
             <a:endParaRPr lang="it-IT"/>
           </a:p>
@@ -782,7 +789,7 @@
           <a:p>
             <a:fld id="{1DE29D66-7661-4855-9E09-50F1C498140F}" type="datetime1">
               <a:rPr lang="it-IT" smtClean="0"/>
-              <a:t>15/11/2016</a:t>
+              <a:t>16/11/2016</a:t>
             </a:fld>
             <a:endParaRPr lang="it-IT"/>
           </a:p>
@@ -960,7 +967,7 @@
           <a:p>
             <a:fld id="{13B9FBBD-5DB3-4531-9557-AB7E2B50A4E1}" type="datetime1">
               <a:rPr lang="it-IT" smtClean="0"/>
-              <a:t>15/11/2016</a:t>
+              <a:t>16/11/2016</a:t>
             </a:fld>
             <a:endParaRPr lang="it-IT"/>
           </a:p>
@@ -1128,7 +1135,7 @@
           <a:p>
             <a:fld id="{CD3D79B7-5B73-40C5-93A9-7E6F90BFB270}" type="datetime1">
               <a:rPr lang="it-IT" smtClean="0"/>
-              <a:t>15/11/2016</a:t>
+              <a:t>16/11/2016</a:t>
             </a:fld>
             <a:endParaRPr lang="it-IT"/>
           </a:p>
@@ -1373,7 +1380,7 @@
           <a:p>
             <a:fld id="{2D8302F8-1172-45B6-8625-C3F8F20F6D0B}" type="datetime1">
               <a:rPr lang="it-IT" smtClean="0"/>
-              <a:t>15/11/2016</a:t>
+              <a:t>16/11/2016</a:t>
             </a:fld>
             <a:endParaRPr lang="it-IT"/>
           </a:p>
@@ -1602,7 +1609,7 @@
           <a:p>
             <a:fld id="{12B4A6A0-D6E2-45D2-8B80-BCFA53B977C5}" type="datetime1">
               <a:rPr lang="it-IT" smtClean="0"/>
-              <a:t>15/11/2016</a:t>
+              <a:t>16/11/2016</a:t>
             </a:fld>
             <a:endParaRPr lang="it-IT"/>
           </a:p>
@@ -1966,7 +1973,7 @@
           <a:p>
             <a:fld id="{A59E91BD-C5BE-4F03-B132-6AEF21DECDB6}" type="datetime1">
               <a:rPr lang="it-IT" smtClean="0"/>
-              <a:t>15/11/2016</a:t>
+              <a:t>16/11/2016</a:t>
             </a:fld>
             <a:endParaRPr lang="it-IT"/>
           </a:p>
@@ -2083,7 +2090,7 @@
           <a:p>
             <a:fld id="{80586C16-C166-4110-A8AC-47620EB60B0D}" type="datetime1">
               <a:rPr lang="it-IT" smtClean="0"/>
-              <a:t>15/11/2016</a:t>
+              <a:t>16/11/2016</a:t>
             </a:fld>
             <a:endParaRPr lang="it-IT"/>
           </a:p>
@@ -2178,7 +2185,7 @@
           <a:p>
             <a:fld id="{473DB2FA-4B81-4734-82A4-CC0E03CB87E4}" type="datetime1">
               <a:rPr lang="it-IT" smtClean="0"/>
-              <a:t>15/11/2016</a:t>
+              <a:t>16/11/2016</a:t>
             </a:fld>
             <a:endParaRPr lang="it-IT"/>
           </a:p>
@@ -2453,7 +2460,7 @@
           <a:p>
             <a:fld id="{437BC292-2DD8-4CB4-8A1E-63E7B8584783}" type="datetime1">
               <a:rPr lang="it-IT" smtClean="0"/>
-              <a:t>15/11/2016</a:t>
+              <a:t>16/11/2016</a:t>
             </a:fld>
             <a:endParaRPr lang="it-IT"/>
           </a:p>
@@ -2705,7 +2712,7 @@
           <a:p>
             <a:fld id="{B00DB2DF-E266-4480-BADE-F1DA93A7DA02}" type="datetime1">
               <a:rPr lang="it-IT" smtClean="0"/>
-              <a:t>15/11/2016</a:t>
+              <a:t>16/11/2016</a:t>
             </a:fld>
             <a:endParaRPr lang="it-IT"/>
           </a:p>
@@ -2916,7 +2923,7 @@
           <a:p>
             <a:fld id="{7B962331-038E-4B5F-9058-3DD6DECCC74A}" type="datetime1">
               <a:rPr lang="it-IT" smtClean="0"/>
-              <a:t>15/11/2016</a:t>
+              <a:t>16/11/2016</a:t>
             </a:fld>
             <a:endParaRPr lang="it-IT"/>
           </a:p>
@@ -3498,31 +3505,13 @@
           <a:p>
             <a:pPr algn="ctr"/>
             <a:r>
-              <a:rPr lang="en-GB" dirty="0"/>
-              <a:t>Alloy</a:t>
-            </a:r>
-          </a:p>
-        </p:txBody>
-      </p:sp>
-      <p:sp>
-        <p:nvSpPr>
-          <p:cNvPr id="3" name="Segnaposto contenuto 2"/>
-          <p:cNvSpPr>
-            <a:spLocks noGrp="1"/>
-          </p:cNvSpPr>
-          <p:nvPr>
-            <p:ph idx="1"/>
-          </p:nvPr>
-        </p:nvSpPr>
-        <p:spPr/>
-        <p:txBody>
-          <a:bodyPr/>
-          <a:lstStyle/>
-          <a:p>
-            <a:r>
-              <a:rPr lang="en-GB" dirty="0"/>
-              <a:t>We use alloy to demonstrate the consistency of our goals and assumptions</a:t>
-            </a:r>
+              <a:rPr lang="it-IT" b="1" dirty="0"/>
+              <a:t>Use case</a:t>
+            </a:r>
+            <a:br>
+              <a:rPr lang="it-IT" dirty="0"/>
+            </a:br>
+            <a:endParaRPr lang="it-IT" dirty="0"/>
           </a:p>
         </p:txBody>
       </p:sp>
@@ -3549,10 +3538,2036 @@
           </a:p>
         </p:txBody>
       </p:sp>
+      <p:pic>
+        <p:nvPicPr>
+          <p:cNvPr id="7" name="Segnaposto contenuto 6"/>
+          <p:cNvPicPr>
+            <a:picLocks noGrp="1" noChangeAspect="1"/>
+          </p:cNvPicPr>
+          <p:nvPr>
+            <p:ph idx="1"/>
+          </p:nvPr>
+        </p:nvPicPr>
+        <p:blipFill>
+          <a:blip r:embed="rId2">
+            <a:extLst>
+              <a:ext uri="{28A0092B-C50C-407E-A947-70E740481C1C}">
+                <a14:useLocalDpi xmlns:a14="http://schemas.microsoft.com/office/drawing/2010/main" val="0"/>
+              </a:ext>
+            </a:extLst>
+          </a:blip>
+          <a:stretch>
+            <a:fillRect/>
+          </a:stretch>
+        </p:blipFill>
+        <p:spPr>
+          <a:xfrm>
+            <a:off x="2438400" y="1398954"/>
+            <a:ext cx="7726721" cy="4957396"/>
+          </a:xfrm>
+        </p:spPr>
+      </p:pic>
+    </p:spTree>
+    <p:extLst>
+      <p:ext uri="{BB962C8B-B14F-4D97-AF65-F5344CB8AC3E}">
+        <p14:creationId xmlns:p14="http://schemas.microsoft.com/office/powerpoint/2010/main" val="3294548396"/>
+      </p:ext>
+    </p:extLst>
+  </p:cSld>
+  <p:clrMapOvr>
+    <a:masterClrMapping/>
+  </p:clrMapOvr>
+</p:sld>
+</file>
+
+<file path=ppt/slides/slide11.xml><?xml version="1.0" encoding="utf-8"?>
+<p:sld xmlns:a="http://schemas.openxmlformats.org/drawingml/2006/main" xmlns:r="http://schemas.openxmlformats.org/officeDocument/2006/relationships" xmlns:p="http://schemas.openxmlformats.org/presentationml/2006/main">
+  <p:cSld>
+    <p:spTree>
+      <p:nvGrpSpPr>
+        <p:cNvPr id="1" name=""/>
+        <p:cNvGrpSpPr/>
+        <p:nvPr/>
+      </p:nvGrpSpPr>
+      <p:grpSpPr>
+        <a:xfrm>
+          <a:off x="0" y="0"/>
+          <a:ext cx="0" cy="0"/>
+          <a:chOff x="0" y="0"/>
+          <a:chExt cx="0" cy="0"/>
+        </a:xfrm>
+      </p:grpSpPr>
+      <p:sp>
+        <p:nvSpPr>
+          <p:cNvPr id="2" name="Titolo 1"/>
+          <p:cNvSpPr>
+            <a:spLocks noGrp="1"/>
+          </p:cNvSpPr>
+          <p:nvPr>
+            <p:ph type="title"/>
+          </p:nvPr>
+        </p:nvSpPr>
+        <p:spPr/>
+        <p:txBody>
+          <a:bodyPr/>
+          <a:lstStyle/>
+          <a:p>
+            <a:pPr algn="ctr"/>
+            <a:r>
+              <a:rPr lang="it-IT" b="1" dirty="0" err="1"/>
+              <a:t>Sequence</a:t>
+            </a:r>
+            <a:r>
+              <a:rPr lang="it-IT" b="1" dirty="0"/>
+              <a:t> </a:t>
+            </a:r>
+            <a:r>
+              <a:rPr lang="it-IT" b="1" dirty="0" err="1"/>
+              <a:t>diagram</a:t>
+            </a:r>
+            <a:endParaRPr lang="it-IT" b="1" dirty="0"/>
+          </a:p>
+        </p:txBody>
+      </p:sp>
+      <p:pic>
+        <p:nvPicPr>
+          <p:cNvPr id="5" name="Segnaposto contenuto 4"/>
+          <p:cNvPicPr>
+            <a:picLocks noGrp="1" noChangeAspect="1"/>
+          </p:cNvPicPr>
+          <p:nvPr>
+            <p:ph idx="1"/>
+          </p:nvPr>
+        </p:nvPicPr>
+        <p:blipFill>
+          <a:blip r:embed="rId2">
+            <a:extLst>
+              <a:ext uri="{28A0092B-C50C-407E-A947-70E740481C1C}">
+                <a14:useLocalDpi xmlns:a14="http://schemas.microsoft.com/office/drawing/2010/main" val="0"/>
+              </a:ext>
+            </a:extLst>
+          </a:blip>
+          <a:stretch>
+            <a:fillRect/>
+          </a:stretch>
+        </p:blipFill>
+        <p:spPr>
+          <a:xfrm>
+            <a:off x="2263699" y="1631968"/>
+            <a:ext cx="7593980" cy="4783134"/>
+          </a:xfrm>
+        </p:spPr>
+      </p:pic>
+      <p:sp>
+        <p:nvSpPr>
+          <p:cNvPr id="4" name="Segnaposto numero diapositiva 3"/>
+          <p:cNvSpPr>
+            <a:spLocks noGrp="1"/>
+          </p:cNvSpPr>
+          <p:nvPr>
+            <p:ph type="sldNum" sz="quarter" idx="12"/>
+          </p:nvPr>
+        </p:nvSpPr>
+        <p:spPr/>
+        <p:txBody>
+          <a:bodyPr/>
+          <a:lstStyle/>
+          <a:p>
+            <a:fld id="{C0F533D6-CA9D-4A56-B56F-59725E032959}" type="slidenum">
+              <a:rPr lang="it-IT" smtClean="0"/>
+              <a:t>11</a:t>
+            </a:fld>
+            <a:endParaRPr lang="it-IT"/>
+          </a:p>
+        </p:txBody>
+      </p:sp>
+    </p:spTree>
+    <p:extLst>
+      <p:ext uri="{BB962C8B-B14F-4D97-AF65-F5344CB8AC3E}">
+        <p14:creationId xmlns:p14="http://schemas.microsoft.com/office/powerpoint/2010/main" val="3694632791"/>
+      </p:ext>
+    </p:extLst>
+  </p:cSld>
+  <p:clrMapOvr>
+    <a:masterClrMapping/>
+  </p:clrMapOvr>
+</p:sld>
+</file>
+
+<file path=ppt/slides/slide12.xml><?xml version="1.0" encoding="utf-8"?>
+<p:sld xmlns:a="http://schemas.openxmlformats.org/drawingml/2006/main" xmlns:r="http://schemas.openxmlformats.org/officeDocument/2006/relationships" xmlns:p="http://schemas.openxmlformats.org/presentationml/2006/main">
+  <p:cSld>
+    <p:spTree>
+      <p:nvGrpSpPr>
+        <p:cNvPr id="1" name=""/>
+        <p:cNvGrpSpPr/>
+        <p:nvPr/>
+      </p:nvGrpSpPr>
+      <p:grpSpPr>
+        <a:xfrm>
+          <a:off x="0" y="0"/>
+          <a:ext cx="0" cy="0"/>
+          <a:chOff x="0" y="0"/>
+          <a:chExt cx="0" cy="0"/>
+        </a:xfrm>
+      </p:grpSpPr>
+      <p:sp>
+        <p:nvSpPr>
+          <p:cNvPr id="2" name="Titolo 1"/>
+          <p:cNvSpPr>
+            <a:spLocks noGrp="1"/>
+          </p:cNvSpPr>
+          <p:nvPr>
+            <p:ph type="title"/>
+          </p:nvPr>
+        </p:nvSpPr>
+        <p:spPr/>
+        <p:txBody>
+          <a:bodyPr/>
+          <a:lstStyle/>
+          <a:p>
+            <a:pPr algn="ctr"/>
+            <a:r>
+              <a:rPr lang="en-GB" dirty="0"/>
+              <a:t>Alloy</a:t>
+            </a:r>
+          </a:p>
+        </p:txBody>
+      </p:sp>
+      <p:sp>
+        <p:nvSpPr>
+          <p:cNvPr id="3" name="Segnaposto contenuto 2"/>
+          <p:cNvSpPr>
+            <a:spLocks noGrp="1"/>
+          </p:cNvSpPr>
+          <p:nvPr>
+            <p:ph idx="1"/>
+          </p:nvPr>
+        </p:nvSpPr>
+        <p:spPr>
+          <a:xfrm>
+            <a:off x="838200" y="1825625"/>
+            <a:ext cx="10673862" cy="4590806"/>
+          </a:xfrm>
+        </p:spPr>
+        <p:txBody>
+          <a:bodyPr>
+            <a:normAutofit fontScale="85000" lnSpcReduction="20000"/>
+          </a:bodyPr>
+          <a:lstStyle/>
+          <a:p>
+            <a:pPr marL="0" indent="0">
+              <a:buNone/>
+            </a:pPr>
+            <a:r>
+              <a:rPr lang="en-GB" dirty="0"/>
+              <a:t>We use alloy to demonstrate the consistency of our goals and assumptions</a:t>
+            </a:r>
+          </a:p>
+          <a:p>
+            <a:pPr marL="0" indent="0">
+              <a:buNone/>
+            </a:pPr>
+            <a:endParaRPr lang="en-GB" dirty="0"/>
+          </a:p>
+          <a:p>
+            <a:pPr marL="0" indent="0">
+              <a:buNone/>
+            </a:pPr>
+            <a:r>
+              <a:rPr lang="en-GB" dirty="0"/>
+              <a:t>fact </a:t>
+            </a:r>
+            <a:r>
+              <a:rPr lang="en-GB" dirty="0" err="1"/>
+              <a:t>onlyRightSendBill</a:t>
+            </a:r>
+            <a:r>
+              <a:rPr lang="en-GB" dirty="0"/>
+              <a:t>{</a:t>
+            </a:r>
+          </a:p>
+          <a:p>
+            <a:pPr marL="0" indent="0">
+              <a:buNone/>
+            </a:pPr>
+            <a:r>
+              <a:rPr lang="en-GB" dirty="0"/>
+              <a:t>	no b1:Bill|(b1.sendBill!= b1.journey.reservation.driver.email)</a:t>
+            </a:r>
+          </a:p>
+          <a:p>
+            <a:pPr marL="0" indent="0">
+              <a:buNone/>
+            </a:pPr>
+            <a:r>
+              <a:rPr lang="en-GB" dirty="0"/>
+              <a:t>	}</a:t>
+            </a:r>
+          </a:p>
+          <a:p>
+            <a:pPr marL="0" indent="0">
+              <a:buNone/>
+            </a:pPr>
+            <a:endParaRPr lang="en-GB" dirty="0"/>
+          </a:p>
+          <a:p>
+            <a:pPr marL="0" indent="0">
+              <a:buNone/>
+            </a:pPr>
+            <a:r>
+              <a:rPr lang="en-GB" dirty="0"/>
+              <a:t>//The system must generate password only when user wants  to </a:t>
+            </a:r>
+            <a:r>
+              <a:rPr lang="en-GB" dirty="0" err="1"/>
+              <a:t>register,no</a:t>
+            </a:r>
+            <a:r>
+              <a:rPr lang="en-GB" dirty="0"/>
+              <a:t> useless password </a:t>
+            </a:r>
+          </a:p>
+          <a:p>
+            <a:pPr marL="0" indent="0">
+              <a:buNone/>
+            </a:pPr>
+            <a:r>
+              <a:rPr lang="en-GB" dirty="0"/>
+              <a:t>fact </a:t>
+            </a:r>
+            <a:r>
+              <a:rPr lang="en-GB" dirty="0" err="1"/>
+              <a:t>noAlonePassoword</a:t>
+            </a:r>
+            <a:r>
+              <a:rPr lang="en-GB" dirty="0"/>
+              <a:t>{</a:t>
+            </a:r>
+          </a:p>
+          <a:p>
+            <a:pPr marL="0" indent="0">
+              <a:buNone/>
+            </a:pPr>
+            <a:r>
+              <a:rPr lang="en-GB" dirty="0"/>
+              <a:t>	no p1:Password|!(p1 in </a:t>
+            </a:r>
+            <a:r>
+              <a:rPr lang="en-GB" dirty="0" err="1"/>
+              <a:t>User.password</a:t>
+            </a:r>
+            <a:r>
+              <a:rPr lang="en-GB" dirty="0"/>
+              <a:t>) </a:t>
+            </a:r>
+          </a:p>
+          <a:p>
+            <a:pPr marL="0" indent="0">
+              <a:buNone/>
+            </a:pPr>
+            <a:endParaRPr lang="en-GB" dirty="0"/>
+          </a:p>
+          <a:p>
+            <a:pPr marL="0" indent="0">
+              <a:buNone/>
+            </a:pPr>
+            <a:r>
+              <a:rPr lang="en-GB" dirty="0"/>
+              <a:t>}</a:t>
+            </a:r>
+          </a:p>
+        </p:txBody>
+      </p:sp>
+      <p:sp>
+        <p:nvSpPr>
+          <p:cNvPr id="4" name="Segnaposto numero diapositiva 3"/>
+          <p:cNvSpPr>
+            <a:spLocks noGrp="1"/>
+          </p:cNvSpPr>
+          <p:nvPr>
+            <p:ph type="sldNum" sz="quarter" idx="12"/>
+          </p:nvPr>
+        </p:nvSpPr>
+        <p:spPr/>
+        <p:txBody>
+          <a:bodyPr/>
+          <a:lstStyle/>
+          <a:p>
+            <a:fld id="{C0F533D6-CA9D-4A56-B56F-59725E032959}" type="slidenum">
+              <a:rPr lang="it-IT" smtClean="0"/>
+              <a:t>12</a:t>
+            </a:fld>
+            <a:endParaRPr lang="it-IT"/>
+          </a:p>
+        </p:txBody>
+      </p:sp>
     </p:spTree>
     <p:extLst>
       <p:ext uri="{BB962C8B-B14F-4D97-AF65-F5344CB8AC3E}">
         <p14:creationId xmlns:p14="http://schemas.microsoft.com/office/powerpoint/2010/main" val="1844853698"/>
+      </p:ext>
+    </p:extLst>
+  </p:cSld>
+  <p:clrMapOvr>
+    <a:masterClrMapping/>
+  </p:clrMapOvr>
+</p:sld>
+</file>
+
+<file path=ppt/slides/slide13.xml><?xml version="1.0" encoding="utf-8"?>
+<p:sld xmlns:a="http://schemas.openxmlformats.org/drawingml/2006/main" xmlns:r="http://schemas.openxmlformats.org/officeDocument/2006/relationships" xmlns:p="http://schemas.openxmlformats.org/presentationml/2006/main">
+  <p:cSld>
+    <p:spTree>
+      <p:nvGrpSpPr>
+        <p:cNvPr id="1" name=""/>
+        <p:cNvGrpSpPr/>
+        <p:nvPr/>
+      </p:nvGrpSpPr>
+      <p:grpSpPr>
+        <a:xfrm>
+          <a:off x="0" y="0"/>
+          <a:ext cx="0" cy="0"/>
+          <a:chOff x="0" y="0"/>
+          <a:chExt cx="0" cy="0"/>
+        </a:xfrm>
+      </p:grpSpPr>
+      <p:sp>
+        <p:nvSpPr>
+          <p:cNvPr id="2" name="Titolo 1"/>
+          <p:cNvSpPr>
+            <a:spLocks noGrp="1"/>
+          </p:cNvSpPr>
+          <p:nvPr>
+            <p:ph type="title"/>
+          </p:nvPr>
+        </p:nvSpPr>
+        <p:spPr/>
+        <p:txBody>
+          <a:bodyPr/>
+          <a:lstStyle/>
+          <a:p>
+            <a:pPr algn="ctr"/>
+            <a:r>
+              <a:rPr lang="en-GB" dirty="0"/>
+              <a:t>Alloy</a:t>
+            </a:r>
+          </a:p>
+        </p:txBody>
+      </p:sp>
+      <p:sp>
+        <p:nvSpPr>
+          <p:cNvPr id="3" name="Segnaposto contenuto 2"/>
+          <p:cNvSpPr>
+            <a:spLocks noGrp="1"/>
+          </p:cNvSpPr>
+          <p:nvPr>
+            <p:ph idx="1"/>
+          </p:nvPr>
+        </p:nvSpPr>
+        <p:spPr/>
+        <p:txBody>
+          <a:bodyPr>
+            <a:normAutofit fontScale="77500" lnSpcReduction="20000"/>
+          </a:bodyPr>
+          <a:lstStyle/>
+          <a:p>
+            <a:pPr marL="0" indent="0">
+              <a:buNone/>
+            </a:pPr>
+            <a:r>
+              <a:rPr lang="en-GB" dirty="0"/>
+              <a:t>// There is only one Email for one user</a:t>
+            </a:r>
+          </a:p>
+          <a:p>
+            <a:pPr marL="0" indent="0">
+              <a:buNone/>
+            </a:pPr>
+            <a:r>
+              <a:rPr lang="en-GB" dirty="0"/>
+              <a:t>fact </a:t>
+            </a:r>
+            <a:r>
+              <a:rPr lang="en-GB" dirty="0" err="1"/>
+              <a:t>noAloneEmail</a:t>
+            </a:r>
+            <a:r>
+              <a:rPr lang="en-GB" dirty="0"/>
+              <a:t>{</a:t>
+            </a:r>
+          </a:p>
+          <a:p>
+            <a:pPr marL="0" indent="0">
+              <a:buNone/>
+            </a:pPr>
+            <a:r>
+              <a:rPr lang="en-GB" dirty="0"/>
+              <a:t>	no m1:Email|!(m1 in </a:t>
+            </a:r>
+            <a:r>
+              <a:rPr lang="en-GB" dirty="0" err="1"/>
+              <a:t>User.email</a:t>
+            </a:r>
+            <a:r>
+              <a:rPr lang="en-GB" dirty="0"/>
+              <a:t>)</a:t>
+            </a:r>
+          </a:p>
+          <a:p>
+            <a:pPr marL="0" indent="0">
+              <a:buNone/>
+            </a:pPr>
+            <a:r>
+              <a:rPr lang="en-GB" dirty="0"/>
+              <a:t>}</a:t>
+            </a:r>
+          </a:p>
+          <a:p>
+            <a:pPr marL="0" indent="0">
+              <a:buNone/>
+            </a:pPr>
+            <a:r>
+              <a:rPr lang="en-GB" dirty="0"/>
+              <a:t>// An user can't reserve more than one car at the same type</a:t>
+            </a:r>
+          </a:p>
+          <a:p>
+            <a:pPr marL="0" indent="0">
+              <a:buNone/>
+            </a:pPr>
+            <a:r>
+              <a:rPr lang="en-GB" dirty="0"/>
+              <a:t>fact </a:t>
+            </a:r>
+            <a:r>
+              <a:rPr lang="en-GB" dirty="0" err="1"/>
+              <a:t>noUserWithMoreReserv</a:t>
+            </a:r>
+            <a:r>
+              <a:rPr lang="en-GB" dirty="0"/>
+              <a:t>{</a:t>
+            </a:r>
+          </a:p>
+          <a:p>
+            <a:pPr marL="0" indent="0">
+              <a:buNone/>
+            </a:pPr>
+            <a:r>
+              <a:rPr lang="en-GB" dirty="0"/>
+              <a:t>	no r1,r2:Reservation | r1!=r2 and (r1.driver=r2.driver or r1.carDrive=r2.carDrive)</a:t>
+            </a:r>
+          </a:p>
+          <a:p>
+            <a:pPr marL="0" indent="0">
+              <a:buNone/>
+            </a:pPr>
+            <a:r>
+              <a:rPr lang="en-GB" dirty="0"/>
+              <a:t>}</a:t>
+            </a:r>
+          </a:p>
+          <a:p>
+            <a:pPr marL="0" indent="0">
+              <a:buNone/>
+            </a:pPr>
+            <a:r>
+              <a:rPr lang="en-GB" dirty="0"/>
+              <a:t>// There aren't user with same </a:t>
+            </a:r>
+            <a:r>
+              <a:rPr lang="en-GB" dirty="0" err="1"/>
+              <a:t>passoword</a:t>
+            </a:r>
+            <a:r>
+              <a:rPr lang="en-GB" dirty="0"/>
+              <a:t> or email, an user can register only one time</a:t>
+            </a:r>
+          </a:p>
+          <a:p>
+            <a:pPr marL="0" indent="0">
+              <a:buNone/>
+            </a:pPr>
+            <a:r>
+              <a:rPr lang="en-GB" dirty="0"/>
+              <a:t>fact </a:t>
+            </a:r>
+            <a:r>
+              <a:rPr lang="en-GB" dirty="0" err="1"/>
+              <a:t>twoTypeUser</a:t>
+            </a:r>
+            <a:r>
+              <a:rPr lang="en-GB" dirty="0"/>
+              <a:t>{</a:t>
+            </a:r>
+          </a:p>
+          <a:p>
+            <a:pPr marL="0" indent="0">
+              <a:buNone/>
+            </a:pPr>
+            <a:r>
+              <a:rPr lang="en-GB" dirty="0"/>
+              <a:t>	no u1,u2: User | u1!=u2 and (u1.password=u2.password or u1.email=u2.email)</a:t>
+            </a:r>
+          </a:p>
+          <a:p>
+            <a:pPr marL="0" indent="0">
+              <a:buNone/>
+            </a:pPr>
+            <a:r>
+              <a:rPr lang="en-GB" dirty="0"/>
+              <a:t>}</a:t>
+            </a:r>
+          </a:p>
+        </p:txBody>
+      </p:sp>
+      <p:sp>
+        <p:nvSpPr>
+          <p:cNvPr id="4" name="Segnaposto numero diapositiva 3"/>
+          <p:cNvSpPr>
+            <a:spLocks noGrp="1"/>
+          </p:cNvSpPr>
+          <p:nvPr>
+            <p:ph type="sldNum" sz="quarter" idx="12"/>
+          </p:nvPr>
+        </p:nvSpPr>
+        <p:spPr/>
+        <p:txBody>
+          <a:bodyPr/>
+          <a:lstStyle/>
+          <a:p>
+            <a:fld id="{C0F533D6-CA9D-4A56-B56F-59725E032959}" type="slidenum">
+              <a:rPr lang="it-IT" smtClean="0"/>
+              <a:t>13</a:t>
+            </a:fld>
+            <a:endParaRPr lang="it-IT"/>
+          </a:p>
+        </p:txBody>
+      </p:sp>
+    </p:spTree>
+    <p:extLst>
+      <p:ext uri="{BB962C8B-B14F-4D97-AF65-F5344CB8AC3E}">
+        <p14:creationId xmlns:p14="http://schemas.microsoft.com/office/powerpoint/2010/main" val="1844853698"/>
+      </p:ext>
+    </p:extLst>
+  </p:cSld>
+  <p:clrMapOvr>
+    <a:masterClrMapping/>
+  </p:clrMapOvr>
+</p:sld>
+</file>
+
+<file path=ppt/slides/slide14.xml><?xml version="1.0" encoding="utf-8"?>
+<p:sld xmlns:a="http://schemas.openxmlformats.org/drawingml/2006/main" xmlns:r="http://schemas.openxmlformats.org/officeDocument/2006/relationships" xmlns:p="http://schemas.openxmlformats.org/presentationml/2006/main">
+  <p:cSld>
+    <p:spTree>
+      <p:nvGrpSpPr>
+        <p:cNvPr id="1" name=""/>
+        <p:cNvGrpSpPr/>
+        <p:nvPr/>
+      </p:nvGrpSpPr>
+      <p:grpSpPr>
+        <a:xfrm>
+          <a:off x="0" y="0"/>
+          <a:ext cx="0" cy="0"/>
+          <a:chOff x="0" y="0"/>
+          <a:chExt cx="0" cy="0"/>
+        </a:xfrm>
+      </p:grpSpPr>
+      <p:sp>
+        <p:nvSpPr>
+          <p:cNvPr id="2" name="Titolo 1"/>
+          <p:cNvSpPr>
+            <a:spLocks noGrp="1"/>
+          </p:cNvSpPr>
+          <p:nvPr>
+            <p:ph type="title"/>
+          </p:nvPr>
+        </p:nvSpPr>
+        <p:spPr/>
+        <p:txBody>
+          <a:bodyPr/>
+          <a:lstStyle/>
+          <a:p>
+            <a:pPr algn="ctr"/>
+            <a:r>
+              <a:rPr lang="it-IT" dirty="0" err="1"/>
+              <a:t>Alloy</a:t>
+            </a:r>
+            <a:endParaRPr lang="it-IT" dirty="0"/>
+          </a:p>
+        </p:txBody>
+      </p:sp>
+      <p:sp>
+        <p:nvSpPr>
+          <p:cNvPr id="3" name="Segnaposto contenuto 2"/>
+          <p:cNvSpPr>
+            <a:spLocks noGrp="1"/>
+          </p:cNvSpPr>
+          <p:nvPr>
+            <p:ph idx="1"/>
+          </p:nvPr>
+        </p:nvSpPr>
+        <p:spPr/>
+        <p:txBody>
+          <a:bodyPr>
+            <a:normAutofit fontScale="77500" lnSpcReduction="20000"/>
+          </a:bodyPr>
+          <a:lstStyle/>
+          <a:p>
+            <a:pPr marL="0" indent="0">
+              <a:buNone/>
+            </a:pPr>
+            <a:r>
+              <a:rPr lang="it-IT" sz="2400" dirty="0"/>
+              <a:t>// An user </a:t>
+            </a:r>
+            <a:r>
+              <a:rPr lang="it-IT" sz="2400" dirty="0" err="1"/>
+              <a:t>have</a:t>
+            </a:r>
+            <a:r>
+              <a:rPr lang="it-IT" sz="2400" dirty="0"/>
+              <a:t> a </a:t>
+            </a:r>
+            <a:r>
+              <a:rPr lang="it-IT" sz="2400" dirty="0" err="1"/>
+              <a:t>journey</a:t>
+            </a:r>
+            <a:r>
+              <a:rPr lang="it-IT" sz="2400" dirty="0"/>
+              <a:t> (ride car) </a:t>
+            </a:r>
+            <a:r>
+              <a:rPr lang="it-IT" sz="2400" dirty="0" err="1"/>
+              <a:t>if</a:t>
+            </a:r>
+            <a:r>
+              <a:rPr lang="it-IT" sz="2400" dirty="0"/>
+              <a:t> </a:t>
+            </a:r>
+            <a:r>
+              <a:rPr lang="it-IT" sz="2400" dirty="0" err="1"/>
+              <a:t>only</a:t>
+            </a:r>
+            <a:r>
+              <a:rPr lang="it-IT" sz="2400" dirty="0"/>
+              <a:t> </a:t>
+            </a:r>
+            <a:r>
+              <a:rPr lang="it-IT" sz="2400" dirty="0" err="1"/>
+              <a:t>if</a:t>
+            </a:r>
+            <a:r>
+              <a:rPr lang="it-IT" sz="2400" dirty="0"/>
+              <a:t> </a:t>
+            </a:r>
+            <a:r>
+              <a:rPr lang="it-IT" sz="2400" dirty="0" err="1"/>
+              <a:t>reservation</a:t>
+            </a:r>
+            <a:r>
+              <a:rPr lang="it-IT" sz="2400" dirty="0"/>
+              <a:t> time </a:t>
+            </a:r>
+            <a:r>
+              <a:rPr lang="it-IT" sz="2400" dirty="0" err="1"/>
+              <a:t>is</a:t>
+            </a:r>
+            <a:r>
+              <a:rPr lang="it-IT" sz="2400" dirty="0"/>
+              <a:t> </a:t>
+            </a:r>
+            <a:r>
+              <a:rPr lang="it-IT" sz="2400" dirty="0" err="1"/>
+              <a:t>not</a:t>
+            </a:r>
+            <a:r>
+              <a:rPr lang="it-IT" sz="2400" dirty="0"/>
+              <a:t> over</a:t>
+            </a:r>
+          </a:p>
+          <a:p>
+            <a:pPr marL="0" indent="0">
+              <a:buNone/>
+            </a:pPr>
+            <a:r>
+              <a:rPr lang="it-IT" sz="2400" dirty="0" err="1"/>
+              <a:t>fact</a:t>
+            </a:r>
+            <a:r>
+              <a:rPr lang="it-IT" sz="2400" dirty="0"/>
+              <a:t> </a:t>
+            </a:r>
+            <a:r>
+              <a:rPr lang="it-IT" sz="2400" dirty="0" err="1"/>
+              <a:t>journeyOnlyTimeIsNotExpired</a:t>
+            </a:r>
+            <a:r>
+              <a:rPr lang="it-IT" sz="2400" dirty="0"/>
+              <a:t>{ </a:t>
+            </a:r>
+          </a:p>
+          <a:p>
+            <a:pPr marL="0" indent="0">
+              <a:buNone/>
+            </a:pPr>
+            <a:r>
+              <a:rPr lang="it-IT" sz="2400" dirty="0"/>
+              <a:t>	no j1: </a:t>
+            </a:r>
+            <a:r>
+              <a:rPr lang="it-IT" sz="2400" dirty="0" err="1"/>
+              <a:t>Journey</a:t>
+            </a:r>
+            <a:r>
+              <a:rPr lang="it-IT" sz="2400" dirty="0"/>
+              <a:t> | j1.reservation.timeUnlock=</a:t>
+            </a:r>
+            <a:r>
+              <a:rPr lang="it-IT" sz="2400" dirty="0" err="1"/>
+              <a:t>OutTime</a:t>
+            </a:r>
+            <a:r>
+              <a:rPr lang="it-IT" sz="2400" dirty="0"/>
+              <a:t> </a:t>
+            </a:r>
+          </a:p>
+          <a:p>
+            <a:pPr marL="0" indent="0">
+              <a:buNone/>
+            </a:pPr>
+            <a:endParaRPr lang="it-IT" sz="2400" dirty="0"/>
+          </a:p>
+          <a:p>
+            <a:pPr marL="0" indent="0">
+              <a:buNone/>
+            </a:pPr>
+            <a:r>
+              <a:rPr lang="it-IT" sz="2400" dirty="0"/>
+              <a:t>}</a:t>
+            </a:r>
+          </a:p>
+          <a:p>
+            <a:pPr marL="0" indent="0">
+              <a:buNone/>
+            </a:pPr>
+            <a:r>
+              <a:rPr lang="it-IT" sz="2400" dirty="0"/>
+              <a:t>// A </a:t>
+            </a:r>
+            <a:r>
+              <a:rPr lang="it-IT" sz="2400" dirty="0" err="1"/>
+              <a:t>reservation</a:t>
+            </a:r>
+            <a:r>
+              <a:rPr lang="it-IT" sz="2400" dirty="0"/>
+              <a:t> </a:t>
+            </a:r>
+            <a:r>
+              <a:rPr lang="it-IT" sz="2400" dirty="0" err="1"/>
+              <a:t>correspond</a:t>
+            </a:r>
+            <a:r>
+              <a:rPr lang="it-IT" sz="2400" dirty="0"/>
+              <a:t> </a:t>
+            </a:r>
+            <a:r>
+              <a:rPr lang="it-IT" sz="2400" dirty="0" err="1"/>
+              <a:t>only</a:t>
+            </a:r>
+            <a:r>
+              <a:rPr lang="it-IT" sz="2400" dirty="0"/>
+              <a:t> one </a:t>
+            </a:r>
+            <a:r>
+              <a:rPr lang="it-IT" sz="2400" dirty="0" err="1"/>
+              <a:t>journey</a:t>
+            </a:r>
+            <a:r>
+              <a:rPr lang="it-IT" sz="2400" dirty="0"/>
+              <a:t>, </a:t>
+            </a:r>
+            <a:r>
+              <a:rPr lang="it-IT" sz="2400" dirty="0" err="1"/>
+              <a:t>reservation</a:t>
+            </a:r>
+            <a:r>
+              <a:rPr lang="it-IT" sz="2400" dirty="0"/>
+              <a:t> </a:t>
+            </a:r>
+            <a:r>
+              <a:rPr lang="it-IT" sz="2400" dirty="0" err="1"/>
+              <a:t>is</a:t>
+            </a:r>
+            <a:r>
+              <a:rPr lang="it-IT" sz="2400" dirty="0"/>
+              <a:t> </a:t>
+            </a:r>
+            <a:r>
+              <a:rPr lang="it-IT" sz="2400" dirty="0" err="1"/>
+              <a:t>unique</a:t>
+            </a:r>
+            <a:endParaRPr lang="it-IT" sz="2400" dirty="0"/>
+          </a:p>
+          <a:p>
+            <a:pPr marL="0" indent="0">
+              <a:buNone/>
+            </a:pPr>
+            <a:r>
+              <a:rPr lang="it-IT" sz="2400" dirty="0" err="1"/>
+              <a:t>fact</a:t>
+            </a:r>
+            <a:r>
+              <a:rPr lang="it-IT" sz="2400" dirty="0"/>
+              <a:t> </a:t>
+            </a:r>
+            <a:r>
+              <a:rPr lang="it-IT" sz="2400" dirty="0" err="1"/>
+              <a:t>notExistTwoSameJourney</a:t>
+            </a:r>
+            <a:r>
+              <a:rPr lang="it-IT" sz="2400" dirty="0"/>
+              <a:t>{</a:t>
+            </a:r>
+          </a:p>
+          <a:p>
+            <a:pPr marL="0" indent="0">
+              <a:buNone/>
+            </a:pPr>
+            <a:r>
+              <a:rPr lang="it-IT" sz="2400" dirty="0"/>
+              <a:t>	no j1,j2: </a:t>
+            </a:r>
+            <a:r>
+              <a:rPr lang="it-IT" sz="2400" dirty="0" err="1"/>
+              <a:t>Journey</a:t>
+            </a:r>
+            <a:r>
+              <a:rPr lang="it-IT" sz="2400" dirty="0"/>
+              <a:t> | j1!=j2 and (j1.reservation=j2.reservation)</a:t>
+            </a:r>
+          </a:p>
+          <a:p>
+            <a:pPr marL="0" indent="0">
+              <a:buNone/>
+            </a:pPr>
+            <a:r>
+              <a:rPr lang="it-IT" sz="2400" dirty="0"/>
+              <a:t>}</a:t>
+            </a:r>
+          </a:p>
+          <a:p>
+            <a:pPr marL="0" indent="0">
+              <a:buNone/>
+            </a:pPr>
+            <a:r>
+              <a:rPr lang="it-IT" sz="2400" dirty="0"/>
+              <a:t>// </a:t>
+            </a:r>
+            <a:r>
+              <a:rPr lang="it-IT" sz="2400" dirty="0" err="1"/>
+              <a:t>If</a:t>
+            </a:r>
+            <a:r>
+              <a:rPr lang="it-IT" sz="2400" dirty="0"/>
+              <a:t> user </a:t>
+            </a:r>
+            <a:r>
+              <a:rPr lang="it-IT" sz="2400" dirty="0" err="1"/>
+              <a:t>unlock</a:t>
+            </a:r>
+            <a:r>
+              <a:rPr lang="it-IT" sz="2400" dirty="0"/>
+              <a:t> the car in </a:t>
+            </a:r>
+            <a:r>
+              <a:rPr lang="it-IT" sz="2400" dirty="0" err="1"/>
+              <a:t>time,he</a:t>
+            </a:r>
+            <a:r>
+              <a:rPr lang="it-IT" sz="2400" dirty="0"/>
+              <a:t> </a:t>
+            </a:r>
+            <a:r>
+              <a:rPr lang="it-IT" sz="2400" dirty="0" err="1"/>
+              <a:t>has</a:t>
+            </a:r>
+            <a:r>
+              <a:rPr lang="it-IT" sz="2400" dirty="0"/>
+              <a:t> a </a:t>
+            </a:r>
+            <a:r>
+              <a:rPr lang="it-IT" sz="2400" dirty="0" err="1"/>
+              <a:t>journey</a:t>
+            </a:r>
+            <a:r>
+              <a:rPr lang="it-IT" sz="2400" dirty="0"/>
+              <a:t>, </a:t>
+            </a:r>
+            <a:r>
+              <a:rPr lang="it-IT" sz="2400" dirty="0" err="1"/>
+              <a:t>nott</a:t>
+            </a:r>
+            <a:r>
+              <a:rPr lang="it-IT" sz="2400" dirty="0"/>
+              <a:t> </a:t>
+            </a:r>
+            <a:r>
+              <a:rPr lang="it-IT" sz="2400" dirty="0" err="1"/>
+              <a:t>exist</a:t>
+            </a:r>
+            <a:r>
+              <a:rPr lang="it-IT" sz="2400" dirty="0"/>
+              <a:t> a </a:t>
+            </a:r>
+            <a:r>
+              <a:rPr lang="it-IT" sz="2400" dirty="0" err="1"/>
+              <a:t>journey</a:t>
+            </a:r>
+            <a:r>
+              <a:rPr lang="it-IT" sz="2400" dirty="0"/>
+              <a:t> </a:t>
+            </a:r>
+            <a:r>
+              <a:rPr lang="it-IT" sz="2400" dirty="0" err="1"/>
+              <a:t>if</a:t>
+            </a:r>
+            <a:r>
+              <a:rPr lang="it-IT" sz="2400" dirty="0"/>
+              <a:t> the </a:t>
+            </a:r>
+            <a:r>
+              <a:rPr lang="it-IT" sz="2400" dirty="0" err="1"/>
+              <a:t>reservation</a:t>
+            </a:r>
+            <a:r>
+              <a:rPr lang="it-IT" sz="2400" dirty="0"/>
+              <a:t> time </a:t>
+            </a:r>
+            <a:r>
+              <a:rPr lang="it-IT" sz="2400" dirty="0" err="1"/>
+              <a:t>is</a:t>
+            </a:r>
+            <a:r>
+              <a:rPr lang="it-IT" sz="2400" dirty="0"/>
+              <a:t> over</a:t>
+            </a:r>
+          </a:p>
+          <a:p>
+            <a:pPr marL="0" indent="0">
+              <a:buNone/>
+            </a:pPr>
+            <a:r>
+              <a:rPr lang="it-IT" sz="2400" dirty="0" err="1"/>
+              <a:t>fact</a:t>
+            </a:r>
+            <a:r>
+              <a:rPr lang="it-IT" sz="2400" dirty="0"/>
+              <a:t> </a:t>
+            </a:r>
+            <a:r>
+              <a:rPr lang="it-IT" sz="2400" dirty="0" err="1"/>
+              <a:t>eachReservationInTimeHasJourney</a:t>
+            </a:r>
+            <a:r>
+              <a:rPr lang="it-IT" sz="2400" dirty="0"/>
+              <a:t>{</a:t>
+            </a:r>
+          </a:p>
+          <a:p>
+            <a:pPr marL="0" indent="0">
+              <a:buNone/>
+            </a:pPr>
+            <a:r>
+              <a:rPr lang="it-IT" sz="2400" dirty="0"/>
+              <a:t>	no r1:Reservation | r1.timeUnlock=</a:t>
+            </a:r>
+            <a:r>
+              <a:rPr lang="it-IT" sz="2400" dirty="0" err="1"/>
+              <a:t>OutTime</a:t>
+            </a:r>
+            <a:r>
+              <a:rPr lang="it-IT" sz="2400" dirty="0"/>
+              <a:t> &amp;&amp; r1 in </a:t>
+            </a:r>
+            <a:r>
+              <a:rPr lang="it-IT" sz="2400" dirty="0" err="1"/>
+              <a:t>Journey.reservation</a:t>
+            </a:r>
+            <a:endParaRPr lang="it-IT" sz="2400" dirty="0"/>
+          </a:p>
+          <a:p>
+            <a:pPr marL="0" indent="0">
+              <a:buNone/>
+            </a:pPr>
+            <a:r>
+              <a:rPr lang="it-IT" sz="2400" dirty="0"/>
+              <a:t>}</a:t>
+            </a:r>
+            <a:endParaRPr lang="it-IT" sz="2400" dirty="0"/>
+          </a:p>
+        </p:txBody>
+      </p:sp>
+      <p:sp>
+        <p:nvSpPr>
+          <p:cNvPr id="4" name="Segnaposto numero diapositiva 3"/>
+          <p:cNvSpPr>
+            <a:spLocks noGrp="1"/>
+          </p:cNvSpPr>
+          <p:nvPr>
+            <p:ph type="sldNum" sz="quarter" idx="12"/>
+          </p:nvPr>
+        </p:nvSpPr>
+        <p:spPr/>
+        <p:txBody>
+          <a:bodyPr/>
+          <a:lstStyle/>
+          <a:p>
+            <a:fld id="{C0F533D6-CA9D-4A56-B56F-59725E032959}" type="slidenum">
+              <a:rPr lang="it-IT" smtClean="0"/>
+              <a:t>14</a:t>
+            </a:fld>
+            <a:endParaRPr lang="it-IT"/>
+          </a:p>
+        </p:txBody>
+      </p:sp>
+    </p:spTree>
+    <p:extLst>
+      <p:ext uri="{BB962C8B-B14F-4D97-AF65-F5344CB8AC3E}">
+        <p14:creationId xmlns:p14="http://schemas.microsoft.com/office/powerpoint/2010/main" val="3535713440"/>
+      </p:ext>
+    </p:extLst>
+  </p:cSld>
+  <p:clrMapOvr>
+    <a:masterClrMapping/>
+  </p:clrMapOvr>
+</p:sld>
+</file>
+
+<file path=ppt/slides/slide15.xml><?xml version="1.0" encoding="utf-8"?>
+<p:sld xmlns:a="http://schemas.openxmlformats.org/drawingml/2006/main" xmlns:r="http://schemas.openxmlformats.org/officeDocument/2006/relationships" xmlns:p="http://schemas.openxmlformats.org/presentationml/2006/main">
+  <p:cSld>
+    <p:spTree>
+      <p:nvGrpSpPr>
+        <p:cNvPr id="1" name=""/>
+        <p:cNvGrpSpPr/>
+        <p:nvPr/>
+      </p:nvGrpSpPr>
+      <p:grpSpPr>
+        <a:xfrm>
+          <a:off x="0" y="0"/>
+          <a:ext cx="0" cy="0"/>
+          <a:chOff x="0" y="0"/>
+          <a:chExt cx="0" cy="0"/>
+        </a:xfrm>
+      </p:grpSpPr>
+      <p:sp>
+        <p:nvSpPr>
+          <p:cNvPr id="2" name="Titolo 1"/>
+          <p:cNvSpPr>
+            <a:spLocks noGrp="1"/>
+          </p:cNvSpPr>
+          <p:nvPr>
+            <p:ph type="title"/>
+          </p:nvPr>
+        </p:nvSpPr>
+        <p:spPr/>
+        <p:txBody>
+          <a:bodyPr/>
+          <a:lstStyle/>
+          <a:p>
+            <a:pPr algn="ctr"/>
+            <a:r>
+              <a:rPr lang="it-IT" dirty="0" err="1"/>
+              <a:t>Alloy</a:t>
+            </a:r>
+            <a:br>
+              <a:rPr lang="it-IT" dirty="0"/>
+            </a:br>
+            <a:endParaRPr lang="it-IT" dirty="0"/>
+          </a:p>
+        </p:txBody>
+      </p:sp>
+      <p:sp>
+        <p:nvSpPr>
+          <p:cNvPr id="3" name="Segnaposto contenuto 2"/>
+          <p:cNvSpPr>
+            <a:spLocks noGrp="1"/>
+          </p:cNvSpPr>
+          <p:nvPr>
+            <p:ph idx="1"/>
+          </p:nvPr>
+        </p:nvSpPr>
+        <p:spPr/>
+        <p:txBody>
+          <a:bodyPr>
+            <a:normAutofit fontScale="85000" lnSpcReduction="20000"/>
+          </a:bodyPr>
+          <a:lstStyle/>
+          <a:p>
+            <a:pPr marL="0" indent="0">
+              <a:buNone/>
+            </a:pPr>
+            <a:r>
+              <a:rPr lang="en-US" sz="2400" dirty="0"/>
+              <a:t>//when a user reserve a </a:t>
+            </a:r>
+            <a:r>
+              <a:rPr lang="en-US" sz="2400" dirty="0" err="1"/>
+              <a:t>car,car</a:t>
+            </a:r>
+            <a:r>
+              <a:rPr lang="en-US" sz="2400" dirty="0"/>
+              <a:t> state must change into not available, not exist reserved car with available state</a:t>
+            </a:r>
+          </a:p>
+          <a:p>
+            <a:pPr marL="0" indent="0">
+              <a:buNone/>
+            </a:pPr>
+            <a:r>
+              <a:rPr lang="en-US" sz="2400" dirty="0"/>
+              <a:t>fact </a:t>
+            </a:r>
+            <a:r>
+              <a:rPr lang="en-US" sz="2400" dirty="0" err="1"/>
+              <a:t>reservedCarMustBeNotAvailable</a:t>
+            </a:r>
+            <a:r>
+              <a:rPr lang="en-US" sz="2400" dirty="0"/>
+              <a:t>{</a:t>
+            </a:r>
+          </a:p>
+          <a:p>
+            <a:pPr marL="0" indent="0">
+              <a:buNone/>
+            </a:pPr>
+            <a:r>
+              <a:rPr lang="en-US" sz="2400" dirty="0"/>
+              <a:t>	no r1:Reservation | r1.carDrive.availability=Available</a:t>
+            </a:r>
+          </a:p>
+          <a:p>
+            <a:pPr marL="0" indent="0">
+              <a:buNone/>
+            </a:pPr>
+            <a:r>
+              <a:rPr lang="en-US" sz="2400" dirty="0"/>
+              <a:t>}</a:t>
+            </a:r>
+          </a:p>
+          <a:p>
+            <a:pPr marL="0" indent="0">
+              <a:buNone/>
+            </a:pPr>
+            <a:r>
+              <a:rPr lang="en-US" sz="2400" dirty="0"/>
+              <a:t>//It's not possible reserve a car with its battery is 20%</a:t>
+            </a:r>
+          </a:p>
+          <a:p>
+            <a:pPr marL="0" indent="0">
+              <a:buNone/>
+            </a:pPr>
+            <a:r>
+              <a:rPr lang="en-US" sz="2400" dirty="0"/>
+              <a:t>fact </a:t>
+            </a:r>
+            <a:r>
+              <a:rPr lang="en-US" sz="2400" dirty="0" err="1"/>
+              <a:t>noReservedCarWithLowerBattery</a:t>
+            </a:r>
+            <a:r>
+              <a:rPr lang="en-US" sz="2400" dirty="0"/>
+              <a:t>{</a:t>
+            </a:r>
+          </a:p>
+          <a:p>
+            <a:pPr marL="0" indent="0">
+              <a:buNone/>
+            </a:pPr>
+            <a:r>
+              <a:rPr lang="en-US" sz="2400" dirty="0"/>
+              <a:t>	no r1:Reservation | r1.carDrive.batteryState=Lower20Battery</a:t>
+            </a:r>
+          </a:p>
+          <a:p>
+            <a:pPr marL="0" indent="0">
+              <a:buNone/>
+            </a:pPr>
+            <a:r>
+              <a:rPr lang="en-US" sz="2400" dirty="0"/>
+              <a:t>}</a:t>
+            </a:r>
+          </a:p>
+          <a:p>
+            <a:pPr marL="0" indent="0">
+              <a:buNone/>
+            </a:pPr>
+            <a:r>
+              <a:rPr lang="en-US" sz="2400" dirty="0"/>
+              <a:t>// if a </a:t>
+            </a:r>
+            <a:r>
+              <a:rPr lang="en-US" sz="2400" dirty="0" err="1"/>
+              <a:t>carBattery</a:t>
+            </a:r>
+            <a:r>
+              <a:rPr lang="en-US" sz="2400" dirty="0"/>
+              <a:t> is lower than 20%,car state must be not available</a:t>
+            </a:r>
+          </a:p>
+          <a:p>
+            <a:pPr marL="0" indent="0">
+              <a:buNone/>
+            </a:pPr>
+            <a:r>
+              <a:rPr lang="en-US" sz="2400" dirty="0"/>
+              <a:t>fact </a:t>
+            </a:r>
+            <a:r>
+              <a:rPr lang="en-US" sz="2400" dirty="0" err="1"/>
+              <a:t>lowerBatteryChangeState</a:t>
+            </a:r>
+            <a:r>
+              <a:rPr lang="en-US" sz="2400" dirty="0"/>
+              <a:t>{</a:t>
+            </a:r>
+          </a:p>
+          <a:p>
+            <a:pPr marL="0" indent="0">
+              <a:buNone/>
+            </a:pPr>
+            <a:r>
+              <a:rPr lang="en-US" sz="2400" dirty="0"/>
+              <a:t>	all c1:Car | c1.batteryState=Lower20Battery  implies c1.availability=</a:t>
+            </a:r>
+            <a:r>
+              <a:rPr lang="en-US" sz="2400" dirty="0" err="1"/>
+              <a:t>NotAvailable</a:t>
+            </a:r>
+            <a:endParaRPr lang="en-US" sz="2400" dirty="0"/>
+          </a:p>
+          <a:p>
+            <a:pPr marL="0" indent="0">
+              <a:buNone/>
+            </a:pPr>
+            <a:r>
+              <a:rPr lang="en-US" sz="2400" dirty="0"/>
+              <a:t>}</a:t>
+            </a:r>
+            <a:endParaRPr lang="it-IT" sz="2400" dirty="0"/>
+          </a:p>
+        </p:txBody>
+      </p:sp>
+      <p:sp>
+        <p:nvSpPr>
+          <p:cNvPr id="4" name="Segnaposto numero diapositiva 3"/>
+          <p:cNvSpPr>
+            <a:spLocks noGrp="1"/>
+          </p:cNvSpPr>
+          <p:nvPr>
+            <p:ph type="sldNum" sz="quarter" idx="12"/>
+          </p:nvPr>
+        </p:nvSpPr>
+        <p:spPr/>
+        <p:txBody>
+          <a:bodyPr/>
+          <a:lstStyle/>
+          <a:p>
+            <a:fld id="{C0F533D6-CA9D-4A56-B56F-59725E032959}" type="slidenum">
+              <a:rPr lang="it-IT" smtClean="0"/>
+              <a:t>15</a:t>
+            </a:fld>
+            <a:endParaRPr lang="it-IT"/>
+          </a:p>
+        </p:txBody>
+      </p:sp>
+    </p:spTree>
+    <p:extLst>
+      <p:ext uri="{BB962C8B-B14F-4D97-AF65-F5344CB8AC3E}">
+        <p14:creationId xmlns:p14="http://schemas.microsoft.com/office/powerpoint/2010/main" val="1580524398"/>
+      </p:ext>
+    </p:extLst>
+  </p:cSld>
+  <p:clrMapOvr>
+    <a:masterClrMapping/>
+  </p:clrMapOvr>
+</p:sld>
+</file>
+
+<file path=ppt/slides/slide16.xml><?xml version="1.0" encoding="utf-8"?>
+<p:sld xmlns:a="http://schemas.openxmlformats.org/drawingml/2006/main" xmlns:r="http://schemas.openxmlformats.org/officeDocument/2006/relationships" xmlns:p="http://schemas.openxmlformats.org/presentationml/2006/main">
+  <p:cSld>
+    <p:spTree>
+      <p:nvGrpSpPr>
+        <p:cNvPr id="1" name=""/>
+        <p:cNvGrpSpPr/>
+        <p:nvPr/>
+      </p:nvGrpSpPr>
+      <p:grpSpPr>
+        <a:xfrm>
+          <a:off x="0" y="0"/>
+          <a:ext cx="0" cy="0"/>
+          <a:chOff x="0" y="0"/>
+          <a:chExt cx="0" cy="0"/>
+        </a:xfrm>
+      </p:grpSpPr>
+      <p:sp>
+        <p:nvSpPr>
+          <p:cNvPr id="2" name="Titolo 1"/>
+          <p:cNvSpPr>
+            <a:spLocks noGrp="1"/>
+          </p:cNvSpPr>
+          <p:nvPr>
+            <p:ph type="title"/>
+          </p:nvPr>
+        </p:nvSpPr>
+        <p:spPr/>
+        <p:txBody>
+          <a:bodyPr/>
+          <a:lstStyle/>
+          <a:p>
+            <a:pPr algn="ctr"/>
+            <a:r>
+              <a:rPr lang="it-IT" dirty="0" err="1"/>
+              <a:t>Alloy</a:t>
+            </a:r>
+            <a:endParaRPr lang="it-IT" dirty="0"/>
+          </a:p>
+        </p:txBody>
+      </p:sp>
+      <p:sp>
+        <p:nvSpPr>
+          <p:cNvPr id="3" name="Segnaposto contenuto 2"/>
+          <p:cNvSpPr>
+            <a:spLocks noGrp="1"/>
+          </p:cNvSpPr>
+          <p:nvPr>
+            <p:ph idx="1"/>
+          </p:nvPr>
+        </p:nvSpPr>
+        <p:spPr/>
+        <p:txBody>
+          <a:bodyPr>
+            <a:normAutofit fontScale="85000" lnSpcReduction="20000"/>
+          </a:bodyPr>
+          <a:lstStyle/>
+          <a:p>
+            <a:pPr marL="0" indent="0">
+              <a:buNone/>
+            </a:pPr>
+            <a:r>
+              <a:rPr lang="en-US" sz="2400" dirty="0"/>
+              <a:t>// There aren't any cars with batteries upper than 20 and  not-available states that they are not a reserved cars</a:t>
+            </a:r>
+          </a:p>
+          <a:p>
+            <a:pPr marL="0" indent="0">
+              <a:buNone/>
+            </a:pPr>
+            <a:r>
+              <a:rPr lang="en-US" sz="2400" dirty="0"/>
+              <a:t>fact </a:t>
+            </a:r>
+            <a:r>
+              <a:rPr lang="en-US" sz="2400" dirty="0" err="1"/>
+              <a:t>noOtherConditionToReservedCar</a:t>
+            </a:r>
+            <a:r>
+              <a:rPr lang="en-US" sz="2400" dirty="0"/>
+              <a:t>{</a:t>
+            </a:r>
+          </a:p>
+          <a:p>
+            <a:pPr marL="0" indent="0">
+              <a:buNone/>
+            </a:pPr>
+            <a:r>
+              <a:rPr lang="en-US" sz="2400" dirty="0"/>
+              <a:t>	no c1:Car|c1.batteryState=Upper20Battery &amp;&amp; c1.availability=</a:t>
+            </a:r>
+            <a:r>
+              <a:rPr lang="en-US" sz="2400" dirty="0" err="1"/>
+              <a:t>NotAvailable</a:t>
+            </a:r>
+            <a:r>
+              <a:rPr lang="en-US" sz="2400" dirty="0"/>
+              <a:t> &amp;&amp; !(c1 in        </a:t>
+            </a:r>
+            <a:r>
+              <a:rPr lang="en-US" sz="2400" dirty="0" err="1"/>
+              <a:t>Reservation.carDrive</a:t>
+            </a:r>
+            <a:r>
+              <a:rPr lang="en-US" sz="2400" dirty="0"/>
+              <a:t>)</a:t>
+            </a:r>
+          </a:p>
+          <a:p>
+            <a:pPr marL="0" indent="0">
+              <a:buNone/>
+            </a:pPr>
+            <a:r>
+              <a:rPr lang="en-US" sz="2400" dirty="0"/>
+              <a:t>}</a:t>
+            </a:r>
+          </a:p>
+          <a:p>
+            <a:pPr marL="0" indent="0">
+              <a:buNone/>
+            </a:pPr>
+            <a:r>
+              <a:rPr lang="en-US" sz="2400" dirty="0"/>
+              <a:t>// A bill correspond at one and only one journey </a:t>
+            </a:r>
+          </a:p>
+          <a:p>
+            <a:pPr marL="0" indent="0">
+              <a:buNone/>
+            </a:pPr>
+            <a:r>
+              <a:rPr lang="en-US" sz="2400" dirty="0"/>
+              <a:t>fact </a:t>
+            </a:r>
+            <a:r>
+              <a:rPr lang="en-US" sz="2400" dirty="0" err="1"/>
+              <a:t>noBillWithMoreJourney</a:t>
+            </a:r>
+            <a:r>
+              <a:rPr lang="en-US" sz="2400" dirty="0"/>
+              <a:t>{</a:t>
+            </a:r>
+          </a:p>
+          <a:p>
+            <a:pPr marL="0" indent="0">
+              <a:buNone/>
+            </a:pPr>
+            <a:r>
+              <a:rPr lang="en-US" sz="2400" dirty="0"/>
+              <a:t>	no b1,b2:Bill | b1!=b2 and (b1.journey=b2.journey)</a:t>
+            </a:r>
+          </a:p>
+          <a:p>
+            <a:pPr marL="0" indent="0">
+              <a:buNone/>
+            </a:pPr>
+            <a:r>
+              <a:rPr lang="en-US" sz="2400" dirty="0"/>
+              <a:t>} fact </a:t>
+            </a:r>
+            <a:r>
+              <a:rPr lang="en-US" sz="2400" dirty="0" err="1"/>
+              <a:t>onlyPassengerSensorUntilTheBill</a:t>
+            </a:r>
+            <a:r>
+              <a:rPr lang="en-US" sz="2400" dirty="0"/>
+              <a:t>{</a:t>
+            </a:r>
+          </a:p>
+          <a:p>
+            <a:pPr marL="0" indent="0">
+              <a:buNone/>
+            </a:pPr>
+            <a:r>
+              <a:rPr lang="en-US" sz="2400" dirty="0"/>
+              <a:t>	no j1:Journey|!(j1 in </a:t>
+            </a:r>
+            <a:r>
+              <a:rPr lang="en-US" sz="2400" dirty="0" err="1"/>
+              <a:t>Bill.journey</a:t>
+            </a:r>
+            <a:r>
+              <a:rPr lang="en-US" sz="2400" dirty="0"/>
+              <a:t>) &amp;&amp; (j1.batteryDiscount=BatteryUpper50 ||j1.pluginDiscount=</a:t>
+            </a:r>
+            <a:r>
+              <a:rPr lang="en-US" sz="2400" dirty="0" err="1"/>
+              <a:t>ParkGridPowerStationAndPlugin</a:t>
+            </a:r>
+            <a:r>
+              <a:rPr lang="en-US" sz="2400" dirty="0"/>
+              <a:t> ||j1.pluginFee=More3KmDistanceOrLow20Battery)</a:t>
+            </a:r>
+          </a:p>
+          <a:p>
+            <a:pPr marL="0" indent="0">
+              <a:buNone/>
+            </a:pPr>
+            <a:r>
+              <a:rPr lang="en-US" sz="2400" dirty="0"/>
+              <a:t>}</a:t>
+            </a:r>
+            <a:endParaRPr lang="it-IT" sz="2400" dirty="0"/>
+          </a:p>
+        </p:txBody>
+      </p:sp>
+      <p:sp>
+        <p:nvSpPr>
+          <p:cNvPr id="4" name="Segnaposto numero diapositiva 3"/>
+          <p:cNvSpPr>
+            <a:spLocks noGrp="1"/>
+          </p:cNvSpPr>
+          <p:nvPr>
+            <p:ph type="sldNum" sz="quarter" idx="12"/>
+          </p:nvPr>
+        </p:nvSpPr>
+        <p:spPr/>
+        <p:txBody>
+          <a:bodyPr/>
+          <a:lstStyle/>
+          <a:p>
+            <a:fld id="{C0F533D6-CA9D-4A56-B56F-59725E032959}" type="slidenum">
+              <a:rPr lang="it-IT" smtClean="0"/>
+              <a:t>16</a:t>
+            </a:fld>
+            <a:endParaRPr lang="it-IT"/>
+          </a:p>
+        </p:txBody>
+      </p:sp>
+    </p:spTree>
+    <p:extLst>
+      <p:ext uri="{BB962C8B-B14F-4D97-AF65-F5344CB8AC3E}">
+        <p14:creationId xmlns:p14="http://schemas.microsoft.com/office/powerpoint/2010/main" val="994127748"/>
+      </p:ext>
+    </p:extLst>
+  </p:cSld>
+  <p:clrMapOvr>
+    <a:masterClrMapping/>
+  </p:clrMapOvr>
+</p:sld>
+</file>
+
+<file path=ppt/slides/slide17.xml><?xml version="1.0" encoding="utf-8"?>
+<p:sld xmlns:a="http://schemas.openxmlformats.org/drawingml/2006/main" xmlns:r="http://schemas.openxmlformats.org/officeDocument/2006/relationships" xmlns:p="http://schemas.openxmlformats.org/presentationml/2006/main">
+  <p:cSld>
+    <p:spTree>
+      <p:nvGrpSpPr>
+        <p:cNvPr id="1" name=""/>
+        <p:cNvGrpSpPr/>
+        <p:nvPr/>
+      </p:nvGrpSpPr>
+      <p:grpSpPr>
+        <a:xfrm>
+          <a:off x="0" y="0"/>
+          <a:ext cx="0" cy="0"/>
+          <a:chOff x="0" y="0"/>
+          <a:chExt cx="0" cy="0"/>
+        </a:xfrm>
+      </p:grpSpPr>
+      <p:sp>
+        <p:nvSpPr>
+          <p:cNvPr id="2" name="Titolo 1"/>
+          <p:cNvSpPr>
+            <a:spLocks noGrp="1"/>
+          </p:cNvSpPr>
+          <p:nvPr>
+            <p:ph type="title"/>
+          </p:nvPr>
+        </p:nvSpPr>
+        <p:spPr/>
+        <p:txBody>
+          <a:bodyPr/>
+          <a:lstStyle/>
+          <a:p>
+            <a:pPr algn="ctr"/>
+            <a:r>
+              <a:rPr lang="it-IT" dirty="0" err="1"/>
+              <a:t>Alloy</a:t>
+            </a:r>
+            <a:endParaRPr lang="it-IT" dirty="0"/>
+          </a:p>
+        </p:txBody>
+      </p:sp>
+      <p:sp>
+        <p:nvSpPr>
+          <p:cNvPr id="3" name="Segnaposto contenuto 2"/>
+          <p:cNvSpPr>
+            <a:spLocks noGrp="1"/>
+          </p:cNvSpPr>
+          <p:nvPr>
+            <p:ph idx="1"/>
+          </p:nvPr>
+        </p:nvSpPr>
+        <p:spPr/>
+        <p:txBody>
+          <a:bodyPr>
+            <a:normAutofit fontScale="55000" lnSpcReduction="20000"/>
+          </a:bodyPr>
+          <a:lstStyle/>
+          <a:p>
+            <a:pPr marL="0" indent="0">
+              <a:buNone/>
+            </a:pPr>
+            <a:r>
+              <a:rPr lang="it-IT" sz="2500" dirty="0"/>
+              <a:t>// </a:t>
+            </a:r>
+            <a:r>
+              <a:rPr lang="it-IT" sz="2500" dirty="0" err="1"/>
+              <a:t>if</a:t>
+            </a:r>
+            <a:r>
+              <a:rPr lang="it-IT" sz="2500" dirty="0"/>
+              <a:t> user </a:t>
+            </a:r>
+            <a:r>
+              <a:rPr lang="it-IT" sz="2500" dirty="0" err="1"/>
+              <a:t>takes</a:t>
+            </a:r>
+            <a:r>
+              <a:rPr lang="it-IT" sz="2500" dirty="0"/>
+              <a:t> more </a:t>
+            </a:r>
+            <a:r>
+              <a:rPr lang="it-IT" sz="2500" dirty="0" err="1"/>
+              <a:t>than</a:t>
+            </a:r>
+            <a:r>
+              <a:rPr lang="it-IT" sz="2500" dirty="0"/>
+              <a:t> one </a:t>
+            </a:r>
+            <a:r>
+              <a:rPr lang="it-IT" sz="2500" dirty="0" err="1"/>
+              <a:t>discount,he</a:t>
+            </a:r>
+            <a:r>
+              <a:rPr lang="it-IT" sz="2500" dirty="0"/>
+              <a:t> </a:t>
+            </a:r>
+            <a:r>
+              <a:rPr lang="it-IT" sz="2500" dirty="0" err="1"/>
+              <a:t>will</a:t>
+            </a:r>
+            <a:r>
+              <a:rPr lang="it-IT" sz="2500" dirty="0"/>
+              <a:t> take </a:t>
+            </a:r>
+            <a:r>
+              <a:rPr lang="it-IT" sz="2500" dirty="0" err="1"/>
+              <a:t>only</a:t>
+            </a:r>
+            <a:r>
+              <a:rPr lang="it-IT" sz="2500" dirty="0"/>
+              <a:t> the </a:t>
+            </a:r>
+            <a:r>
+              <a:rPr lang="it-IT" sz="2500" dirty="0" err="1"/>
+              <a:t>bigger</a:t>
+            </a:r>
+            <a:r>
+              <a:rPr lang="it-IT" sz="2500" dirty="0"/>
+              <a:t> one</a:t>
+            </a:r>
+          </a:p>
+          <a:p>
+            <a:pPr marL="0" indent="0">
+              <a:buNone/>
+            </a:pPr>
+            <a:r>
+              <a:rPr lang="it-IT" sz="2500" dirty="0"/>
+              <a:t>//</a:t>
+            </a:r>
+            <a:r>
+              <a:rPr lang="it-IT" sz="2500" dirty="0" err="1"/>
+              <a:t>if</a:t>
+            </a:r>
+            <a:r>
+              <a:rPr lang="it-IT" sz="2500" dirty="0"/>
+              <a:t> user </a:t>
+            </a:r>
+            <a:r>
+              <a:rPr lang="it-IT" sz="2500" dirty="0" err="1"/>
+              <a:t>takes</a:t>
+            </a:r>
+            <a:r>
+              <a:rPr lang="it-IT" sz="2500" dirty="0"/>
+              <a:t> a </a:t>
+            </a:r>
+            <a:r>
+              <a:rPr lang="it-IT" sz="2500" dirty="0" err="1"/>
+              <a:t>fee</a:t>
+            </a:r>
+            <a:r>
+              <a:rPr lang="it-IT" sz="2500" dirty="0"/>
+              <a:t> </a:t>
+            </a:r>
+            <a:r>
+              <a:rPr lang="it-IT" sz="2500" dirty="0" err="1"/>
+              <a:t>during</a:t>
+            </a:r>
+            <a:r>
+              <a:rPr lang="it-IT" sz="2500" dirty="0"/>
+              <a:t> the ride and </a:t>
+            </a:r>
+            <a:r>
+              <a:rPr lang="it-IT" sz="2500" dirty="0" err="1"/>
+              <a:t>other</a:t>
+            </a:r>
+            <a:r>
+              <a:rPr lang="it-IT" sz="2500" dirty="0"/>
+              <a:t> discount, the </a:t>
+            </a:r>
+            <a:r>
+              <a:rPr lang="it-IT" sz="2500" dirty="0" err="1"/>
+              <a:t>bill</a:t>
+            </a:r>
+            <a:r>
+              <a:rPr lang="it-IT" sz="2500" dirty="0"/>
+              <a:t> </a:t>
+            </a:r>
+            <a:r>
+              <a:rPr lang="it-IT" sz="2500" dirty="0" err="1"/>
+              <a:t>will</a:t>
+            </a:r>
+            <a:r>
+              <a:rPr lang="it-IT" sz="2500" dirty="0"/>
+              <a:t> </a:t>
+            </a:r>
+            <a:r>
+              <a:rPr lang="it-IT" sz="2500" dirty="0" err="1"/>
+              <a:t>count</a:t>
+            </a:r>
+            <a:r>
+              <a:rPr lang="it-IT" sz="2500" dirty="0"/>
+              <a:t> </a:t>
+            </a:r>
+            <a:r>
+              <a:rPr lang="it-IT" sz="2500" dirty="0" err="1"/>
+              <a:t>only</a:t>
+            </a:r>
+            <a:r>
+              <a:rPr lang="it-IT" sz="2500" dirty="0"/>
+              <a:t> the </a:t>
+            </a:r>
+            <a:r>
+              <a:rPr lang="it-IT" sz="2500" dirty="0" err="1"/>
+              <a:t>fee</a:t>
+            </a:r>
+            <a:r>
+              <a:rPr lang="it-IT" sz="2500" dirty="0"/>
+              <a:t>.</a:t>
+            </a:r>
+          </a:p>
+          <a:p>
+            <a:pPr marL="0" indent="0">
+              <a:buNone/>
+            </a:pPr>
+            <a:r>
+              <a:rPr lang="it-IT" sz="2500" dirty="0" err="1"/>
+              <a:t>fact</a:t>
+            </a:r>
+            <a:r>
+              <a:rPr lang="it-IT" sz="2500" dirty="0"/>
+              <a:t> </a:t>
+            </a:r>
+            <a:r>
+              <a:rPr lang="it-IT" sz="2500" dirty="0" err="1"/>
+              <a:t>whatDiscountOrFee</a:t>
+            </a:r>
+            <a:r>
+              <a:rPr lang="it-IT" sz="2500" dirty="0"/>
+              <a:t>{</a:t>
+            </a:r>
+          </a:p>
+          <a:p>
+            <a:pPr marL="0" indent="0">
+              <a:buNone/>
+            </a:pPr>
+            <a:r>
+              <a:rPr lang="it-IT" sz="2500" dirty="0"/>
+              <a:t>	</a:t>
+            </a:r>
+            <a:r>
+              <a:rPr lang="it-IT" sz="2500" dirty="0" err="1"/>
+              <a:t>all</a:t>
+            </a:r>
+            <a:r>
+              <a:rPr lang="it-IT" sz="2500" dirty="0"/>
+              <a:t> b1:Bill|b1.journey.passengerDiscount=</a:t>
+            </a:r>
+            <a:r>
+              <a:rPr lang="it-IT" sz="2500" dirty="0" err="1"/>
+              <a:t>NoPassengersSensor</a:t>
+            </a:r>
+            <a:r>
+              <a:rPr lang="it-IT" sz="2500" dirty="0"/>
+              <a:t> &amp;&amp; b1.journey.batteryDiscount=BatteryLower50 &amp;&amp; b1.journey.pluginDiscount=</a:t>
+            </a:r>
+            <a:r>
+              <a:rPr lang="it-IT" sz="2500" dirty="0" err="1"/>
+              <a:t>NotParkGridPowerStation</a:t>
+            </a:r>
+            <a:r>
+              <a:rPr lang="it-IT" sz="2500" dirty="0"/>
+              <a:t> &amp;&amp; b1.journey.pluginFee= Lower3kmDistanceAndMore20Battery=&gt;b1.payment=</a:t>
+            </a:r>
+            <a:r>
+              <a:rPr lang="it-IT" sz="2500" dirty="0" err="1"/>
+              <a:t>NormalPay</a:t>
+            </a:r>
+            <a:endParaRPr lang="it-IT" sz="2500" dirty="0"/>
+          </a:p>
+          <a:p>
+            <a:pPr marL="0" indent="0">
+              <a:buNone/>
+            </a:pPr>
+            <a:r>
+              <a:rPr lang="it-IT" sz="2500" dirty="0"/>
+              <a:t>	no b1:Bill|(b1.journey.passengerDiscount=</a:t>
+            </a:r>
+            <a:r>
+              <a:rPr lang="it-IT" sz="2500" dirty="0" err="1"/>
+              <a:t>YesPassengersSensor</a:t>
+            </a:r>
+            <a:r>
+              <a:rPr lang="it-IT" sz="2500" dirty="0"/>
+              <a:t> || b1.journey.batteryDiscount=BatteryUpper50 || b1.journey.pluginDiscount=</a:t>
+            </a:r>
+            <a:r>
+              <a:rPr lang="it-IT" sz="2500" dirty="0" err="1"/>
+              <a:t>ParkGridPowerStationAndPlugin</a:t>
+            </a:r>
+            <a:r>
+              <a:rPr lang="it-IT" sz="2500" dirty="0"/>
+              <a:t> ||b1.journey.pluginFee=More3KmDistanceOrLow20Battery) &amp;&amp;b1.payment=</a:t>
+            </a:r>
+            <a:r>
+              <a:rPr lang="it-IT" sz="2500" dirty="0" err="1"/>
+              <a:t>NormalPay</a:t>
+            </a:r>
+            <a:endParaRPr lang="it-IT" sz="2500" dirty="0"/>
+          </a:p>
+          <a:p>
+            <a:pPr marL="0" indent="0">
+              <a:buNone/>
+            </a:pPr>
+            <a:r>
+              <a:rPr lang="it-IT" sz="2500" dirty="0"/>
+              <a:t>	no b1:Bill|b1.journey.pluginFee=More3KmDistanceOrLow20Battery &amp;&amp; b1.payment!=Fee30</a:t>
+            </a:r>
+          </a:p>
+          <a:p>
+            <a:pPr marL="0" indent="0">
+              <a:buNone/>
+            </a:pPr>
+            <a:r>
+              <a:rPr lang="it-IT" sz="2500" dirty="0"/>
+              <a:t>	no b1:Bill|b1.journey.pluginFee= Lower3kmDistanceAndMore20Battery &amp;&amp; b1.journey.pluginDiscount=</a:t>
+            </a:r>
+            <a:r>
+              <a:rPr lang="it-IT" sz="2500" dirty="0" err="1"/>
+              <a:t>ParkGridPowerStationAndPlugin</a:t>
+            </a:r>
+            <a:r>
+              <a:rPr lang="it-IT" sz="2500" dirty="0"/>
+              <a:t>  &amp;&amp;b1.payment!=Discount30</a:t>
+            </a:r>
+          </a:p>
+          <a:p>
+            <a:pPr marL="0" indent="0">
+              <a:buNone/>
+            </a:pPr>
+            <a:r>
+              <a:rPr lang="it-IT" sz="2500" dirty="0"/>
+              <a:t>	no b1:Bill|b1.journey.pluginFee= Lower3kmDistanceAndMore20Battery &amp;&amp; b1.journey.pluginDiscount=</a:t>
+            </a:r>
+            <a:r>
+              <a:rPr lang="it-IT" sz="2500" dirty="0" err="1"/>
+              <a:t>NotParkGridPowerStation</a:t>
+            </a:r>
+            <a:r>
+              <a:rPr lang="it-IT" sz="2500" dirty="0"/>
+              <a:t> &amp;&amp; b1.journey.batteryDiscount=BatteryUpper50 &amp;&amp; b1.payment!=Discount20</a:t>
+            </a:r>
+          </a:p>
+          <a:p>
+            <a:pPr marL="0" indent="0">
+              <a:buNone/>
+            </a:pPr>
+            <a:r>
+              <a:rPr lang="it-IT" sz="2500" dirty="0"/>
+              <a:t>	no b1:Bill|b1.journey.pluginFee= Lower3kmDistanceAndMore20Battery &amp;&amp; b1.journey.pluginDiscount=</a:t>
+            </a:r>
+            <a:r>
+              <a:rPr lang="it-IT" sz="2500" dirty="0" err="1"/>
+              <a:t>NotParkGridPowerStation</a:t>
+            </a:r>
+            <a:r>
+              <a:rPr lang="it-IT" sz="2500" dirty="0"/>
+              <a:t> &amp;&amp; b1.journey.batteryDiscount=BatteryLower50 &amp;&amp; b1.journey.passengerDiscount=</a:t>
+            </a:r>
+            <a:r>
+              <a:rPr lang="it-IT" sz="2500" dirty="0" err="1"/>
+              <a:t>YesPassengersSensor</a:t>
+            </a:r>
+            <a:r>
+              <a:rPr lang="it-IT" sz="2500" dirty="0"/>
+              <a:t> &amp;&amp; b1.payment!=Discount10</a:t>
+            </a:r>
+          </a:p>
+          <a:p>
+            <a:pPr marL="0" indent="0">
+              <a:buNone/>
+            </a:pPr>
+            <a:r>
+              <a:rPr lang="it-IT" sz="2500" dirty="0"/>
+              <a:t>	no j1:Journey|j1.pluginFee=More3KmDistanceOrLow20Battery &amp;&amp; j1.pluginDiscount=</a:t>
+            </a:r>
+            <a:r>
+              <a:rPr lang="it-IT" sz="2500" dirty="0" err="1"/>
+              <a:t>ParkGridPowerStationAndPlugin</a:t>
+            </a:r>
+            <a:r>
+              <a:rPr lang="it-IT" sz="2500" dirty="0"/>
+              <a:t> </a:t>
+            </a:r>
+          </a:p>
+          <a:p>
+            <a:pPr marL="0" indent="0">
+              <a:buNone/>
+            </a:pPr>
+            <a:r>
+              <a:rPr lang="it-IT" sz="2500" dirty="0"/>
+              <a:t>}</a:t>
+            </a:r>
+          </a:p>
+          <a:p>
+            <a:pPr marL="0" indent="0">
+              <a:buNone/>
+            </a:pPr>
+            <a:endParaRPr lang="it-IT" sz="2400" dirty="0"/>
+          </a:p>
+        </p:txBody>
+      </p:sp>
+      <p:sp>
+        <p:nvSpPr>
+          <p:cNvPr id="4" name="Segnaposto numero diapositiva 3"/>
+          <p:cNvSpPr>
+            <a:spLocks noGrp="1"/>
+          </p:cNvSpPr>
+          <p:nvPr>
+            <p:ph type="sldNum" sz="quarter" idx="12"/>
+          </p:nvPr>
+        </p:nvSpPr>
+        <p:spPr/>
+        <p:txBody>
+          <a:bodyPr/>
+          <a:lstStyle/>
+          <a:p>
+            <a:fld id="{C0F533D6-CA9D-4A56-B56F-59725E032959}" type="slidenum">
+              <a:rPr lang="it-IT" smtClean="0"/>
+              <a:t>17</a:t>
+            </a:fld>
+            <a:endParaRPr lang="it-IT"/>
+          </a:p>
+        </p:txBody>
+      </p:sp>
+    </p:spTree>
+    <p:extLst>
+      <p:ext uri="{BB962C8B-B14F-4D97-AF65-F5344CB8AC3E}">
+        <p14:creationId xmlns:p14="http://schemas.microsoft.com/office/powerpoint/2010/main" val="2608596578"/>
       </p:ext>
     </p:extLst>
   </p:cSld>

</xml_diff>